<commit_message>
Presentatio add source for quote
</commit_message>
<xml_diff>
--- a/docs/presentation/presentation-slides.pptx
+++ b/docs/presentation/presentation-slides.pptx
@@ -4498,8 +4498,8 @@
         </p:nvSpPr>
         <p:spPr>
           <a:xfrm>
-            <a:off x="1219200" y="1576387"/>
-            <a:ext cx="10510838" cy="1309687"/>
+            <a:off x="1219200" y="1363445"/>
+            <a:ext cx="10510838" cy="1569544"/>
           </a:xfrm>
           <a:prstGeom prst="rect">
             <a:avLst/>
@@ -4560,12 +4560,29 @@
             </a:r>
             <a:r>
               <a:rPr lang="en-US" sz="2000" dirty="0"/>
-              <a:t>, ethnicity, gender, sexual orientation, nationality, religion, or other characteristic.“ TODO: Quelle</a:t>
-            </a:r>
-          </a:p>
-          <a:p>
-            <a:pPr algn="ctr"/>
-            <a:endParaRPr lang="de-DE" sz="2000" dirty="0"/>
+              <a:t>, ethnicity, gender, sexual orientation, nationality, religion, or other characteristic.“ </a:t>
+            </a:r>
+            <a:endParaRPr lang="en-US" dirty="0"/>
+          </a:p>
+          <a:p>
+            <a:pPr algn="r">
+              <a:lnSpc>
+                <a:spcPct val="200000"/>
+              </a:lnSpc>
+            </a:pPr>
+            <a:r>
+              <a:rPr lang="en-US" sz="1400" i="1" dirty="0"/>
+              <a:t>- Ona de </a:t>
+            </a:r>
+            <a:r>
+              <a:rPr lang="en-US" sz="1400" i="1" dirty="0" err="1"/>
+              <a:t>Gibert</a:t>
+            </a:r>
+            <a:r>
+              <a:rPr lang="en-US" sz="1400" i="1" dirty="0"/>
+              <a:t> (“Hate Speech Dataset from a White Supremacy Forum)</a:t>
+            </a:r>
+            <a:endParaRPr lang="de-DE" sz="1400" i="1" dirty="0"/>
           </a:p>
         </p:txBody>
       </p:sp>

</xml_diff>